<commit_message>
Add fixed thesis draft and edited README
</commit_message>
<xml_diff>
--- a/Thesis/Presentation/Single-phase Fluid FD Simulator.pptx
+++ b/Thesis/Presentation/Single-phase Fluid FD Simulator.pptx
@@ -308,7 +308,7 @@
               <a:cs typeface="+mn-cs"/>
             </a:defRPr>
           </a:pPr>
-          <a:endParaRPr lang="id-ID"/>
+          <a:endParaRPr lang="en-US"/>
         </a:p>
       </c:txPr>
     </c:title>
@@ -704,11 +704,11 @@
           <c:showPercent val="0"/>
           <c:showBubbleSize val="0"/>
         </c:dLbls>
-        <c:axId val="514432"/>
-        <c:axId val="514976"/>
+        <c:axId val="116159024"/>
+        <c:axId val="117207664"/>
       </c:scatterChart>
       <c:valAx>
-        <c:axId val="514432"/>
+        <c:axId val="116159024"/>
         <c:scaling>
           <c:orientation val="minMax"/>
           <c:max val="5"/>
@@ -781,7 +781,7 @@
                   <a:cs typeface="+mn-cs"/>
                 </a:defRPr>
               </a:pPr>
-              <a:endParaRPr lang="id-ID"/>
+              <a:endParaRPr lang="en-US"/>
             </a:p>
           </c:txPr>
         </c:title>
@@ -819,15 +819,15 @@
                 <a:cs typeface="+mn-cs"/>
               </a:defRPr>
             </a:pPr>
-            <a:endParaRPr lang="id-ID"/>
+            <a:endParaRPr lang="en-US"/>
           </a:p>
         </c:txPr>
-        <c:crossAx val="514976"/>
+        <c:crossAx val="117207664"/>
         <c:crosses val="autoZero"/>
         <c:crossBetween val="midCat"/>
       </c:valAx>
       <c:valAx>
-        <c:axId val="514976"/>
+        <c:axId val="117207664"/>
         <c:scaling>
           <c:orientation val="minMax"/>
           <c:min val="3500"/>
@@ -900,7 +900,7 @@
                   <a:cs typeface="+mn-cs"/>
                 </a:defRPr>
               </a:pPr>
-              <a:endParaRPr lang="id-ID"/>
+              <a:endParaRPr lang="en-US"/>
             </a:p>
           </c:txPr>
         </c:title>
@@ -938,10 +938,10 @@
                 <a:cs typeface="+mn-cs"/>
               </a:defRPr>
             </a:pPr>
-            <a:endParaRPr lang="id-ID"/>
+            <a:endParaRPr lang="en-US"/>
           </a:p>
         </c:txPr>
-        <c:crossAx val="514432"/>
+        <c:crossAx val="116159024"/>
         <c:crosses val="autoZero"/>
         <c:crossBetween val="midCat"/>
       </c:valAx>
@@ -981,7 +981,7 @@
               <a:cs typeface="+mn-cs"/>
             </a:defRPr>
           </a:pPr>
-          <a:endParaRPr lang="id-ID"/>
+          <a:endParaRPr lang="en-US"/>
         </a:p>
       </c:txPr>
     </c:legend>
@@ -1006,7 +1006,7 @@
       <a:pPr>
         <a:defRPr sz="800"/>
       </a:pPr>
-      <a:endParaRPr lang="id-ID"/>
+      <a:endParaRPr lang="en-US"/>
     </a:p>
   </c:txPr>
   <c:externalData r:id="rId3">
@@ -1081,7 +1081,7 @@
               <a:cs typeface="+mn-cs"/>
             </a:defRPr>
           </a:pPr>
-          <a:endParaRPr lang="id-ID"/>
+          <a:endParaRPr lang="en-US"/>
         </a:p>
       </c:txPr>
     </c:title>
@@ -2475,11 +2475,11 @@
           <c:showPercent val="0"/>
           <c:showBubbleSize val="0"/>
         </c:dLbls>
-        <c:axId val="525312"/>
-        <c:axId val="524768"/>
+        <c:axId val="116830040"/>
+        <c:axId val="117767488"/>
       </c:scatterChart>
       <c:valAx>
-        <c:axId val="525312"/>
+        <c:axId val="116830040"/>
         <c:scaling>
           <c:orientation val="minMax"/>
           <c:min val="25"/>
@@ -2552,7 +2552,7 @@
                   <a:cs typeface="+mn-cs"/>
                 </a:defRPr>
               </a:pPr>
-              <a:endParaRPr lang="id-ID"/>
+              <a:endParaRPr lang="en-US"/>
             </a:p>
           </c:txPr>
         </c:title>
@@ -2590,15 +2590,15 @@
                 <a:cs typeface="+mn-cs"/>
               </a:defRPr>
             </a:pPr>
-            <a:endParaRPr lang="id-ID"/>
+            <a:endParaRPr lang="en-US"/>
           </a:p>
         </c:txPr>
-        <c:crossAx val="524768"/>
+        <c:crossAx val="117767488"/>
         <c:crosses val="autoZero"/>
         <c:crossBetween val="midCat"/>
       </c:valAx>
       <c:valAx>
-        <c:axId val="524768"/>
+        <c:axId val="117767488"/>
         <c:scaling>
           <c:orientation val="minMax"/>
           <c:min val="5000"/>
@@ -2671,7 +2671,7 @@
                   <a:cs typeface="+mn-cs"/>
                 </a:defRPr>
               </a:pPr>
-              <a:endParaRPr lang="id-ID"/>
+              <a:endParaRPr lang="en-US"/>
             </a:p>
           </c:txPr>
         </c:title>
@@ -2709,10 +2709,10 @@
                 <a:cs typeface="+mn-cs"/>
               </a:defRPr>
             </a:pPr>
-            <a:endParaRPr lang="id-ID"/>
+            <a:endParaRPr lang="en-US"/>
           </a:p>
         </c:txPr>
-        <c:crossAx val="525312"/>
+        <c:crossAx val="116830040"/>
         <c:crosses val="autoZero"/>
         <c:crossBetween val="midCat"/>
       </c:valAx>
@@ -2752,7 +2752,7 @@
               <a:cs typeface="+mn-cs"/>
             </a:defRPr>
           </a:pPr>
-          <a:endParaRPr lang="id-ID"/>
+          <a:endParaRPr lang="en-US"/>
         </a:p>
       </c:txPr>
     </c:legend>
@@ -2777,7 +2777,7 @@
       <a:pPr>
         <a:defRPr/>
       </a:pPr>
-      <a:endParaRPr lang="id-ID"/>
+      <a:endParaRPr lang="en-US"/>
     </a:p>
   </c:txPr>
   <c:externalData r:id="rId3">
@@ -2852,7 +2852,7 @@
               <a:cs typeface="+mn-cs"/>
             </a:defRPr>
           </a:pPr>
-          <a:endParaRPr lang="id-ID"/>
+          <a:endParaRPr lang="en-US"/>
         </a:p>
       </c:txPr>
     </c:title>
@@ -3610,11 +3610,11 @@
           <c:showPercent val="0"/>
           <c:showBubbleSize val="0"/>
         </c:dLbls>
-        <c:axId val="522048"/>
-        <c:axId val="511712"/>
+        <c:axId val="117147256"/>
+        <c:axId val="117766696"/>
       </c:scatterChart>
       <c:valAx>
-        <c:axId val="522048"/>
+        <c:axId val="117147256"/>
         <c:scaling>
           <c:orientation val="minMax"/>
           <c:min val="0"/>
@@ -3687,7 +3687,7 @@
                   <a:cs typeface="+mn-cs"/>
                 </a:defRPr>
               </a:pPr>
-              <a:endParaRPr lang="id-ID"/>
+              <a:endParaRPr lang="en-US"/>
             </a:p>
           </c:txPr>
         </c:title>
@@ -3725,15 +3725,15 @@
                 <a:cs typeface="+mn-cs"/>
               </a:defRPr>
             </a:pPr>
-            <a:endParaRPr lang="id-ID"/>
+            <a:endParaRPr lang="en-US"/>
           </a:p>
         </c:txPr>
-        <c:crossAx val="511712"/>
+        <c:crossAx val="117766696"/>
         <c:crosses val="autoZero"/>
         <c:crossBetween val="midCat"/>
       </c:valAx>
       <c:valAx>
-        <c:axId val="511712"/>
+        <c:axId val="117766696"/>
         <c:scaling>
           <c:orientation val="minMax"/>
           <c:max val="6200"/>
@@ -3807,7 +3807,7 @@
                   <a:cs typeface="+mn-cs"/>
                 </a:defRPr>
               </a:pPr>
-              <a:endParaRPr lang="id-ID"/>
+              <a:endParaRPr lang="en-US"/>
             </a:p>
           </c:txPr>
         </c:title>
@@ -3845,10 +3845,10 @@
                 <a:cs typeface="+mn-cs"/>
               </a:defRPr>
             </a:pPr>
-            <a:endParaRPr lang="id-ID"/>
+            <a:endParaRPr lang="en-US"/>
           </a:p>
         </c:txPr>
-        <c:crossAx val="522048"/>
+        <c:crossAx val="117147256"/>
         <c:crosses val="autoZero"/>
         <c:crossBetween val="midCat"/>
       </c:valAx>
@@ -3888,7 +3888,7 @@
               <a:cs typeface="+mn-cs"/>
             </a:defRPr>
           </a:pPr>
-          <a:endParaRPr lang="id-ID"/>
+          <a:endParaRPr lang="en-US"/>
         </a:p>
       </c:txPr>
     </c:legend>
@@ -3913,7 +3913,7 @@
       <a:pPr>
         <a:defRPr/>
       </a:pPr>
-      <a:endParaRPr lang="id-ID"/>
+      <a:endParaRPr lang="en-US"/>
     </a:p>
   </c:txPr>
   <c:externalData r:id="rId3">
@@ -5672,7 +5672,7 @@
           <a:p>
             <a:fld id="{E4AEA790-25D6-40F0-81BD-50B79F372767}" type="datetimeFigureOut">
               <a:rPr lang="en-US" smtClean="0"/>
-              <a:t>6/21/2016</a:t>
+              <a:t>6/22/2016</a:t>
             </a:fld>
             <a:endParaRPr lang="en-US"/>
           </a:p>
@@ -5837,7 +5837,7 @@
           <a:p>
             <a:fld id="{BCBB33D0-ADE6-40A1-8C0E-A8A6FFB24542}" type="datetimeFigureOut">
               <a:rPr lang="en-US" smtClean="0"/>
-              <a:t>6/21/2016</a:t>
+              <a:t>6/22/2016</a:t>
             </a:fld>
             <a:endParaRPr lang="en-US"/>
           </a:p>
@@ -6667,7 +6667,7 @@
           <a:p>
             <a:fld id="{DC32E6AA-A516-4C5A-8006-A21EFF94BA4C}" type="datetimeFigureOut">
               <a:rPr lang="en-US" smtClean="0"/>
-              <a:t>6/21/2016</a:t>
+              <a:t>6/22/2016</a:t>
             </a:fld>
             <a:endParaRPr lang="en-US"/>
           </a:p>
@@ -6875,7 +6875,7 @@
           <a:p>
             <a:fld id="{DC32E6AA-A516-4C5A-8006-A21EFF94BA4C}" type="datetimeFigureOut">
               <a:rPr lang="en-US" smtClean="0"/>
-              <a:t>6/21/2016</a:t>
+              <a:t>6/22/2016</a:t>
             </a:fld>
             <a:endParaRPr lang="en-US"/>
           </a:p>
@@ -7131,7 +7131,7 @@
           <a:p>
             <a:fld id="{DC32E6AA-A516-4C5A-8006-A21EFF94BA4C}" type="datetimeFigureOut">
               <a:rPr lang="en-US" smtClean="0"/>
-              <a:t>6/21/2016</a:t>
+              <a:t>6/22/2016</a:t>
             </a:fld>
             <a:endParaRPr lang="en-US"/>
           </a:p>
@@ -7305,7 +7305,7 @@
           <a:p>
             <a:fld id="{DC32E6AA-A516-4C5A-8006-A21EFF94BA4C}" type="datetimeFigureOut">
               <a:rPr lang="en-US" smtClean="0"/>
-              <a:t>6/21/2016</a:t>
+              <a:t>6/22/2016</a:t>
             </a:fld>
             <a:endParaRPr lang="en-US"/>
           </a:p>
@@ -7648,7 +7648,7 @@
           <a:p>
             <a:fld id="{DC32E6AA-A516-4C5A-8006-A21EFF94BA4C}" type="datetimeFigureOut">
               <a:rPr lang="en-US" smtClean="0"/>
-              <a:t>6/21/2016</a:t>
+              <a:t>6/22/2016</a:t>
             </a:fld>
             <a:endParaRPr lang="en-US"/>
           </a:p>
@@ -7923,7 +7923,7 @@
           <a:p>
             <a:fld id="{DC32E6AA-A516-4C5A-8006-A21EFF94BA4C}" type="datetimeFigureOut">
               <a:rPr lang="en-US" smtClean="0"/>
-              <a:t>6/21/2016</a:t>
+              <a:t>6/22/2016</a:t>
             </a:fld>
             <a:endParaRPr lang="en-US"/>
           </a:p>
@@ -8302,7 +8302,7 @@
           <a:p>
             <a:fld id="{DC32E6AA-A516-4C5A-8006-A21EFF94BA4C}" type="datetimeFigureOut">
               <a:rPr lang="en-US" smtClean="0"/>
-              <a:t>6/21/2016</a:t>
+              <a:t>6/22/2016</a:t>
             </a:fld>
             <a:endParaRPr lang="en-US"/>
           </a:p>
@@ -8420,7 +8420,7 @@
           <a:p>
             <a:fld id="{DC32E6AA-A516-4C5A-8006-A21EFF94BA4C}" type="datetimeFigureOut">
               <a:rPr lang="en-US" smtClean="0"/>
-              <a:t>6/21/2016</a:t>
+              <a:t>6/22/2016</a:t>
             </a:fld>
             <a:endParaRPr lang="en-US"/>
           </a:p>
@@ -8591,7 +8591,7 @@
           <a:p>
             <a:fld id="{DC32E6AA-A516-4C5A-8006-A21EFF94BA4C}" type="datetimeFigureOut">
               <a:rPr lang="en-US" smtClean="0"/>
-              <a:t>6/21/2016</a:t>
+              <a:t>6/22/2016</a:t>
             </a:fld>
             <a:endParaRPr lang="en-US"/>
           </a:p>
@@ -8945,7 +8945,7 @@
           <a:p>
             <a:fld id="{DC32E6AA-A516-4C5A-8006-A21EFF94BA4C}" type="datetimeFigureOut">
               <a:rPr lang="en-US" smtClean="0"/>
-              <a:t>6/21/2016</a:t>
+              <a:t>6/22/2016</a:t>
             </a:fld>
             <a:endParaRPr lang="en-US"/>
           </a:p>
@@ -9327,7 +9327,7 @@
           <a:p>
             <a:fld id="{DC32E6AA-A516-4C5A-8006-A21EFF94BA4C}" type="datetimeFigureOut">
               <a:rPr lang="en-US" smtClean="0"/>
-              <a:t>6/21/2016</a:t>
+              <a:t>6/22/2016</a:t>
             </a:fld>
             <a:endParaRPr lang="en-US"/>
           </a:p>
@@ -9614,7 +9614,7 @@
           <a:p>
             <a:fld id="{DC32E6AA-A516-4C5A-8006-A21EFF94BA4C}" type="datetimeFigureOut">
               <a:rPr lang="en-US" smtClean="0"/>
-              <a:t>6/21/2016</a:t>
+              <a:t>6/22/2016</a:t>
             </a:fld>
             <a:endParaRPr lang="en-US"/>
           </a:p>
@@ -13155,11 +13155,7 @@
             </a:r>
             <a:r>
               <a:rPr lang="en-US" dirty="0" smtClean="0"/>
-              <a:t> </a:t>
-            </a:r>
-            <a:r>
-              <a:rPr lang="en-US" dirty="0" smtClean="0"/>
-              <a:t>stack</a:t>
+              <a:t> stack</a:t>
             </a:r>
           </a:p>
           <a:p>
@@ -13182,15 +13178,7 @@
             </a:pPr>
             <a:r>
               <a:rPr lang="en-US" dirty="0" smtClean="0"/>
-              <a:t>Applying </a:t>
-            </a:r>
-            <a:r>
-              <a:rPr lang="en-US" dirty="0" smtClean="0"/>
-              <a:t>Finite-difference </a:t>
-            </a:r>
-            <a:r>
-              <a:rPr lang="en-US" dirty="0" smtClean="0"/>
-              <a:t>Method</a:t>
+              <a:t>Applying Finite-difference Method</a:t>
             </a:r>
             <a:endParaRPr lang="id-ID" dirty="0" smtClean="0"/>
           </a:p>
@@ -13211,11 +13199,7 @@
             </a:pPr>
             <a:r>
               <a:rPr lang="en-US" dirty="0" smtClean="0"/>
-              <a:t>Running </a:t>
-            </a:r>
-            <a:r>
-              <a:rPr lang="en-US" dirty="0" smtClean="0"/>
-              <a:t>a simulation</a:t>
+              <a:t>Running a simulation</a:t>
             </a:r>
           </a:p>
           <a:p>
@@ -21831,8 +21815,8 @@
           </p:sp>
         </mc:Fallback>
       </mc:AlternateContent>
-      <mc:AlternateContent xmlns:mc="http://schemas.openxmlformats.org/markup-compatibility/2006">
-        <mc:Choice xmlns:a14="http://schemas.microsoft.com/office/drawing/2010/main" Requires="a14">
+      <mc:AlternateContent xmlns:mc="http://schemas.openxmlformats.org/markup-compatibility/2006" xmlns:a14="http://schemas.microsoft.com/office/drawing/2010/main">
+        <mc:Choice Requires="a14">
           <p:sp>
             <p:nvSpPr>
               <p:cNvPr id="14" name="Rectangle 13"/>
@@ -21857,11 +21841,7 @@
                 <a:pPr algn="ctr"/>
                 <a:r>
                   <a:rPr lang="en-US" dirty="0" smtClean="0"/>
-                  <a:t>Apply finite-difference w.r.t</a:t>
-                </a:r>
-                <a:r>
-                  <a:rPr lang="en-US" dirty="0" smtClean="0"/>
-                  <a:t>. </a:t>
+                  <a:t>Apply finite-difference w.r.t. </a:t>
                 </a:r>
                 <a14:m>
                   <m:oMath xmlns:m="http://schemas.openxmlformats.org/officeDocument/2006/math">
@@ -21878,7 +21858,7 @@
             </p:txBody>
           </p:sp>
         </mc:Choice>
-        <mc:Fallback>
+        <mc:Fallback xmlns="">
           <p:sp>
             <p:nvSpPr>
               <p:cNvPr id="14" name="Rectangle 13"/>
@@ -27146,11 +27126,7 @@
             </a:r>
             <a:r>
               <a:rPr lang="en-US" dirty="0" smtClean="0"/>
-              <a:t> </a:t>
-            </a:r>
-            <a:r>
-              <a:rPr lang="en-US" dirty="0" smtClean="0"/>
-              <a:t>stack</a:t>
+              <a:t> stack</a:t>
             </a:r>
           </a:p>
           <a:p>
@@ -38212,7 +38188,15 @@
             <a:pPr marL="233363" lvl="1"/>
             <a:r>
               <a:rPr lang="en-US" sz="3600" dirty="0" smtClean="0"/>
-              <a:t>The results obtained using the simulator seems to follow the same trend as the analytical solution.</a:t>
+              <a:t>The results obtained using the simulator </a:t>
+            </a:r>
+            <a:r>
+              <a:rPr lang="en-US" sz="3600" dirty="0" smtClean="0"/>
+              <a:t>seem </a:t>
+            </a:r>
+            <a:r>
+              <a:rPr lang="en-US" sz="3600" dirty="0" smtClean="0"/>
+              <a:t>to follow the same trend as the analytical solution.</a:t>
             </a:r>
           </a:p>
           <a:p>
@@ -39935,11 +39919,7 @@
             </a:r>
             <a:r>
               <a:rPr lang="en-US" dirty="0" smtClean="0"/>
-              <a:t> </a:t>
-            </a:r>
-            <a:r>
-              <a:rPr lang="en-US" dirty="0" smtClean="0"/>
-              <a:t>stack</a:t>
+              <a:t> stack</a:t>
             </a:r>
           </a:p>
           <a:p>

</xml_diff>